<commit_message>
Dodat jos jedan primer
</commit_message>
<xml_diff>
--- a/Seminarski/Nuclio.pptx
+++ b/Seminarski/Nuclio.pptx
@@ -5,7 +5,7 @@
     <p:sldMasterId id="2147483658" r:id="rId1"/>
   </p:sldMasterIdLst>
   <p:notesMasterIdLst>
-    <p:notesMasterId r:id="rId18"/>
+    <p:notesMasterId r:id="rId19"/>
   </p:notesMasterIdLst>
   <p:sldIdLst>
     <p:sldId id="256" r:id="rId2"/>
@@ -23,22 +23,23 @@
     <p:sldId id="307" r:id="rId14"/>
     <p:sldId id="309" r:id="rId15"/>
     <p:sldId id="310" r:id="rId16"/>
-    <p:sldId id="308" r:id="rId17"/>
+    <p:sldId id="311" r:id="rId17"/>
+    <p:sldId id="308" r:id="rId18"/>
   </p:sldIdLst>
   <p:sldSz cx="9144000" cy="5143500" type="screen16x9"/>
   <p:notesSz cx="6858000" cy="9144000"/>
   <p:embeddedFontLst>
     <p:embeddedFont>
       <p:font typeface="Roboto Slab" panose="020B0604020202020204" charset="0"/>
-      <p:regular r:id="rId19"/>
-      <p:bold r:id="rId20"/>
+      <p:regular r:id="rId20"/>
+      <p:bold r:id="rId21"/>
     </p:embeddedFont>
     <p:embeddedFont>
       <p:font typeface="Source Sans Pro" panose="020B0503030403020204" pitchFamily="34" charset="0"/>
-      <p:regular r:id="rId21"/>
-      <p:bold r:id="rId22"/>
-      <p:italic r:id="rId23"/>
-      <p:boldItalic r:id="rId24"/>
+      <p:regular r:id="rId22"/>
+      <p:bold r:id="rId23"/>
+      <p:italic r:id="rId24"/>
+      <p:boldItalic r:id="rId25"/>
     </p:embeddedFont>
   </p:embeddedFontLst>
   <p:defaultTextStyle>
@@ -283,6 +284,7 @@
   <p1510:revLst>
     <p1510:client id="{02E69C67-930A-4E3D-85EC-EE664D67D3D7}" v="850" dt="2022-05-13T10:11:49.506"/>
     <p1510:client id="{053C3355-901A-12FE-F7D5-12A4F03D0A91}" v="43" dt="2022-05-23T11:42:52.731"/>
+    <p1510:client id="{BEC0F1FC-CD81-613B-FC2A-A8D7F47DCF0C}" v="70" dt="2022-05-24T12:48:12.177"/>
     <p1510:client id="{C30AD466-21FE-BBB3-57C3-50C30514695C}" v="39" dt="2022-05-23T21:59:28.241"/>
   </p1510:revLst>
 </p1510:revInfo>
@@ -1260,6 +1262,115 @@
     <p:extLst>
       <p:ext uri="{BB962C8B-B14F-4D97-AF65-F5344CB8AC3E}">
         <p14:creationId xmlns:p14="http://schemas.microsoft.com/office/powerpoint/2010/main" val="4202882127"/>
+      </p:ext>
+    </p:extLst>
+  </p:cSld>
+  <p:clrMapOvr>
+    <a:masterClrMapping/>
+  </p:clrMapOvr>
+</p:notes>
+</file>
+
+<file path=ppt/notesSlides/notesSlide14.xml><?xml version="1.0" encoding="utf-8"?>
+<p:notes xmlns:a="http://schemas.openxmlformats.org/drawingml/2006/main" xmlns:r="http://schemas.openxmlformats.org/officeDocument/2006/relationships" xmlns:p="http://schemas.openxmlformats.org/presentationml/2006/main" showMasterSp="0" showMasterPhAnim="0">
+  <p:cSld>
+    <p:spTree>
+      <p:nvGrpSpPr>
+        <p:cNvPr id="1" name="Shape 106"/>
+        <p:cNvGrpSpPr/>
+        <p:nvPr/>
+      </p:nvGrpSpPr>
+      <p:grpSpPr>
+        <a:xfrm>
+          <a:off x="0" y="0"/>
+          <a:ext cx="0" cy="0"/>
+          <a:chOff x="0" y="0"/>
+          <a:chExt cx="0" cy="0"/>
+        </a:xfrm>
+      </p:grpSpPr>
+      <p:sp>
+        <p:nvSpPr>
+          <p:cNvPr id="107" name="Google Shape;107;p:notes"/>
+          <p:cNvSpPr>
+            <a:spLocks noGrp="1" noRot="1" noChangeAspect="1"/>
+          </p:cNvSpPr>
+          <p:nvPr>
+            <p:ph type="sldImg" idx="2"/>
+          </p:nvPr>
+        </p:nvSpPr>
+        <p:spPr>
+          <a:xfrm>
+            <a:off x="381000" y="685800"/>
+            <a:ext cx="6096000" cy="3429000"/>
+          </a:xfrm>
+          <a:custGeom>
+            <a:avLst/>
+            <a:gdLst/>
+            <a:ahLst/>
+            <a:cxnLst/>
+            <a:rect l="l" t="t" r="r" b="b"/>
+            <a:pathLst>
+              <a:path w="120000" h="120000" extrusionOk="0">
+                <a:moveTo>
+                  <a:pt x="0" y="0"/>
+                </a:moveTo>
+                <a:lnTo>
+                  <a:pt x="120000" y="0"/>
+                </a:lnTo>
+                <a:lnTo>
+                  <a:pt x="120000" y="120000"/>
+                </a:lnTo>
+                <a:lnTo>
+                  <a:pt x="0" y="120000"/>
+                </a:lnTo>
+                <a:close/>
+              </a:path>
+            </a:pathLst>
+          </a:custGeom>
+        </p:spPr>
+      </p:sp>
+      <p:sp>
+        <p:nvSpPr>
+          <p:cNvPr id="108" name="Google Shape;108;p:notes"/>
+          <p:cNvSpPr txBox="1">
+            <a:spLocks noGrp="1"/>
+          </p:cNvSpPr>
+          <p:nvPr>
+            <p:ph type="body" idx="1"/>
+          </p:nvPr>
+        </p:nvSpPr>
+        <p:spPr>
+          <a:xfrm>
+            <a:off x="685800" y="4343400"/>
+            <a:ext cx="5486400" cy="4114800"/>
+          </a:xfrm>
+          <a:prstGeom prst="rect">
+            <a:avLst/>
+          </a:prstGeom>
+        </p:spPr>
+        <p:txBody>
+          <a:bodyPr spcFirstLastPara="1" wrap="square" lIns="91425" tIns="91425" rIns="91425" bIns="91425" anchor="t" anchorCtr="0">
+            <a:noAutofit/>
+          </a:bodyPr>
+          <a:lstStyle/>
+          <a:p>
+            <a:pPr marL="0" lvl="0" indent="0" algn="l" rtl="0">
+              <a:spcBef>
+                <a:spcPts val="0"/>
+              </a:spcBef>
+              <a:spcAft>
+                <a:spcPts val="0"/>
+              </a:spcAft>
+              <a:buNone/>
+            </a:pPr>
+            <a:endParaRPr/>
+          </a:p>
+        </p:txBody>
+      </p:sp>
+    </p:spTree>
+    <p:extLst>
+      <p:ext uri="{BB962C8B-B14F-4D97-AF65-F5344CB8AC3E}">
+        <p14:creationId xmlns:p14="http://schemas.microsoft.com/office/powerpoint/2010/main" val="3769629644"/>
       </p:ext>
     </p:extLst>
   </p:cSld>
@@ -8484,7 +8595,7 @@
           <a:p>
             <a:r>
               <a:rPr lang="sr-Latn-RS" sz="7200" dirty="0"/>
-              <a:t>PRIMER</a:t>
+              <a:t>PRIMERI</a:t>
             </a:r>
             <a:endParaRPr lang="en-US" sz="7200" dirty="0"/>
           </a:p>
@@ -8584,7 +8695,7 @@
           <a:p>
             <a:r>
               <a:rPr lang="sr-Latn-RS" dirty="0"/>
-              <a:t>Primer – Dodavanje vremena</a:t>
+              <a:t>Primer 1 – Dodavanje vremena</a:t>
             </a:r>
           </a:p>
         </p:txBody>
@@ -8792,6 +8903,169 @@
 </file>
 
 <file path=ppt/slides/slide16.xml><?xml version="1.0" encoding="utf-8"?>
+<p:sld xmlns:a="http://schemas.openxmlformats.org/drawingml/2006/main" xmlns:r="http://schemas.openxmlformats.org/officeDocument/2006/relationships" xmlns:p="http://schemas.openxmlformats.org/presentationml/2006/main">
+  <p:cSld>
+    <p:spTree>
+      <p:nvGrpSpPr>
+        <p:cNvPr id="1" name="Shape 109"/>
+        <p:cNvGrpSpPr/>
+        <p:nvPr/>
+      </p:nvGrpSpPr>
+      <p:grpSpPr>
+        <a:xfrm>
+          <a:off x="0" y="0"/>
+          <a:ext cx="0" cy="0"/>
+          <a:chOff x="0" y="0"/>
+          <a:chExt cx="0" cy="0"/>
+        </a:xfrm>
+      </p:grpSpPr>
+      <p:sp>
+        <p:nvSpPr>
+          <p:cNvPr id="112" name="Google Shape;112;p17"/>
+          <p:cNvSpPr txBox="1">
+            <a:spLocks noGrp="1"/>
+          </p:cNvSpPr>
+          <p:nvPr>
+            <p:ph type="sldNum" idx="12"/>
+          </p:nvPr>
+        </p:nvSpPr>
+        <p:spPr>
+          <a:xfrm>
+            <a:off x="8404384" y="4749851"/>
+            <a:ext cx="548700" cy="393600"/>
+          </a:xfrm>
+          <a:prstGeom prst="rect">
+            <a:avLst/>
+          </a:prstGeom>
+        </p:spPr>
+        <p:txBody>
+          <a:bodyPr spcFirstLastPara="1" wrap="square" lIns="91425" tIns="91425" rIns="91425" bIns="91425" anchor="t" anchorCtr="0">
+            <a:noAutofit/>
+          </a:bodyPr>
+          <a:lstStyle/>
+          <a:p>
+            <a:pPr marL="0" lvl="0" indent="0" algn="r" rtl="0">
+              <a:spcBef>
+                <a:spcPts val="0"/>
+              </a:spcBef>
+              <a:spcAft>
+                <a:spcPts val="0"/>
+              </a:spcAft>
+              <a:buNone/>
+            </a:pPr>
+            <a:fld id="{00000000-1234-1234-1234-123412341234}" type="slidenum">
+              <a:rPr lang="en"/>
+              <a:t>16</a:t>
+            </a:fld>
+            <a:endParaRPr/>
+          </a:p>
+        </p:txBody>
+      </p:sp>
+      <p:sp>
+        <p:nvSpPr>
+          <p:cNvPr id="2" name="Title 1"/>
+          <p:cNvSpPr>
+            <a:spLocks noGrp="1"/>
+          </p:cNvSpPr>
+          <p:nvPr>
+            <p:ph type="title"/>
+          </p:nvPr>
+        </p:nvSpPr>
+        <p:spPr>
+          <a:xfrm>
+            <a:off x="1574273" y="-100272"/>
+            <a:ext cx="7571700" cy="702600"/>
+          </a:xfrm>
+        </p:spPr>
+        <p:txBody>
+          <a:bodyPr/>
+          <a:lstStyle/>
+          <a:p>
+            <a:r>
+              <a:rPr lang="sr-Latn-RS" dirty="0"/>
+              <a:t>Primer 2 – Face </a:t>
+            </a:r>
+            <a:r>
+              <a:rPr lang="sr-Latn-RS" dirty="0" err="1"/>
+              <a:t>recognizer</a:t>
+            </a:r>
+          </a:p>
+        </p:txBody>
+      </p:sp>
+      <p:pic>
+        <p:nvPicPr>
+          <p:cNvPr id="7" name="Slika 7" descr="Slika na kojoj se nalazi tekst, osoba, poziranje, grupa&#10;&#10;Opis je automatski generisan">
+            <a:extLst>
+              <a:ext uri="{FF2B5EF4-FFF2-40B4-BE49-F238E27FC236}">
+                <a16:creationId xmlns:a16="http://schemas.microsoft.com/office/drawing/2014/main" id="{F9549738-7EA4-F836-2FE7-06584F15A75A}"/>
+              </a:ext>
+            </a:extLst>
+          </p:cNvPr>
+          <p:cNvPicPr>
+            <a:picLocks noChangeAspect="1"/>
+          </p:cNvPicPr>
+          <p:nvPr/>
+        </p:nvPicPr>
+        <p:blipFill>
+          <a:blip r:embed="rId3"/>
+          <a:stretch>
+            <a:fillRect/>
+          </a:stretch>
+        </p:blipFill>
+        <p:spPr>
+          <a:xfrm>
+            <a:off x="3948793" y="1951264"/>
+            <a:ext cx="2818039" cy="2996293"/>
+          </a:xfrm>
+          <a:prstGeom prst="rect">
+            <a:avLst/>
+          </a:prstGeom>
+        </p:spPr>
+      </p:pic>
+      <p:pic>
+        <p:nvPicPr>
+          <p:cNvPr id="8" name="Slika 8" descr="Slika na kojoj se nalazi sto&#10;&#10;Opis je automatski generisan">
+            <a:extLst>
+              <a:ext uri="{FF2B5EF4-FFF2-40B4-BE49-F238E27FC236}">
+                <a16:creationId xmlns:a16="http://schemas.microsoft.com/office/drawing/2014/main" id="{8CFB68AF-3CB6-89FF-856B-269F2AFB3CFA}"/>
+              </a:ext>
+            </a:extLst>
+          </p:cNvPr>
+          <p:cNvPicPr>
+            <a:picLocks noChangeAspect="1"/>
+          </p:cNvPicPr>
+          <p:nvPr/>
+        </p:nvPicPr>
+        <p:blipFill>
+          <a:blip r:embed="rId4"/>
+          <a:stretch>
+            <a:fillRect/>
+          </a:stretch>
+        </p:blipFill>
+        <p:spPr>
+          <a:xfrm>
+            <a:off x="533400" y="769584"/>
+            <a:ext cx="5260522" cy="1073403"/>
+          </a:xfrm>
+          <a:prstGeom prst="rect">
+            <a:avLst/>
+          </a:prstGeom>
+        </p:spPr>
+      </p:pic>
+    </p:spTree>
+    <p:extLst>
+      <p:ext uri="{BB962C8B-B14F-4D97-AF65-F5344CB8AC3E}">
+        <p14:creationId xmlns:p14="http://schemas.microsoft.com/office/powerpoint/2010/main" val="3820996524"/>
+      </p:ext>
+    </p:extLst>
+  </p:cSld>
+  <p:clrMapOvr>
+    <a:masterClrMapping/>
+  </p:clrMapOvr>
+</p:sld>
+</file>
+
+<file path=ppt/slides/slide17.xml><?xml version="1.0" encoding="utf-8"?>
 <p:sld xmlns:a="http://schemas.openxmlformats.org/drawingml/2006/main" xmlns:r="http://schemas.openxmlformats.org/officeDocument/2006/relationships" xmlns:p="http://schemas.openxmlformats.org/presentationml/2006/main">
   <p:cSld>
     <p:spTree>

</xml_diff>